<commit_message>
Organisation and analysis WO3196
</commit_message>
<xml_diff>
--- a/Measurements/20200116 WO3196 measurements with window/20200120 WO3196 H2 Drop/WO3196 H2 drop test.pptx
+++ b/Measurements/20200116 WO3196 measurements with window/20200120 WO3196 H2 Drop/WO3196 H2 drop test.pptx
@@ -6,12 +6,13 @@
   </p:sldMasterIdLst>
   <p:sldIdLst>
     <p:sldId id="257" r:id="rId2"/>
-    <p:sldId id="259" r:id="rId3"/>
-    <p:sldId id="261" r:id="rId4"/>
-    <p:sldId id="258" r:id="rId5"/>
-    <p:sldId id="262" r:id="rId6"/>
-    <p:sldId id="260" r:id="rId7"/>
-    <p:sldId id="263" r:id="rId8"/>
+    <p:sldId id="264" r:id="rId3"/>
+    <p:sldId id="259" r:id="rId4"/>
+    <p:sldId id="261" r:id="rId5"/>
+    <p:sldId id="258" r:id="rId6"/>
+    <p:sldId id="262" r:id="rId7"/>
+    <p:sldId id="260" r:id="rId8"/>
+    <p:sldId id="263" r:id="rId9"/>
   </p:sldIdLst>
   <p:sldSz cx="12192000" cy="6858000"/>
   <p:notesSz cx="6858000" cy="9144000"/>
@@ -110,6 +111,11 @@
       </a:defRPr>
     </a:lvl9pPr>
   </p:defaultTextStyle>
+  <p:extLst>
+    <p:ext uri="{EFAFB233-063F-42B5-8137-9DF3F51BA10A}">
+      <p15:sldGuideLst xmlns:p15="http://schemas.microsoft.com/office/powerpoint/2012/main"/>
+    </p:ext>
+  </p:extLst>
 </p:presentation>
 </file>
 
@@ -262,7 +268,7 @@
           <a:p>
             <a:fld id="{4A1B796E-3F27-498F-B926-603C854E15E7}" type="datetimeFigureOut">
               <a:rPr lang="en-GB" smtClean="0"/>
-              <a:t>24/01/2020</a:t>
+              <a:t>27/01/2020</a:t>
             </a:fld>
             <a:endParaRPr lang="en-GB"/>
           </a:p>
@@ -462,7 +468,7 @@
           <a:p>
             <a:fld id="{4A1B796E-3F27-498F-B926-603C854E15E7}" type="datetimeFigureOut">
               <a:rPr lang="en-GB" smtClean="0"/>
-              <a:t>24/01/2020</a:t>
+              <a:t>27/01/2020</a:t>
             </a:fld>
             <a:endParaRPr lang="en-GB"/>
           </a:p>
@@ -672,7 +678,7 @@
           <a:p>
             <a:fld id="{4A1B796E-3F27-498F-B926-603C854E15E7}" type="datetimeFigureOut">
               <a:rPr lang="en-GB" smtClean="0"/>
-              <a:t>24/01/2020</a:t>
+              <a:t>27/01/2020</a:t>
             </a:fld>
             <a:endParaRPr lang="en-GB"/>
           </a:p>
@@ -872,7 +878,7 @@
           <a:p>
             <a:fld id="{4A1B796E-3F27-498F-B926-603C854E15E7}" type="datetimeFigureOut">
               <a:rPr lang="en-GB" smtClean="0"/>
-              <a:t>24/01/2020</a:t>
+              <a:t>27/01/2020</a:t>
             </a:fld>
             <a:endParaRPr lang="en-GB"/>
           </a:p>
@@ -1148,7 +1154,7 @@
           <a:p>
             <a:fld id="{4A1B796E-3F27-498F-B926-603C854E15E7}" type="datetimeFigureOut">
               <a:rPr lang="en-GB" smtClean="0"/>
-              <a:t>24/01/2020</a:t>
+              <a:t>27/01/2020</a:t>
             </a:fld>
             <a:endParaRPr lang="en-GB"/>
           </a:p>
@@ -1416,7 +1422,7 @@
           <a:p>
             <a:fld id="{4A1B796E-3F27-498F-B926-603C854E15E7}" type="datetimeFigureOut">
               <a:rPr lang="en-GB" smtClean="0"/>
-              <a:t>24/01/2020</a:t>
+              <a:t>27/01/2020</a:t>
             </a:fld>
             <a:endParaRPr lang="en-GB"/>
           </a:p>
@@ -1831,7 +1837,7 @@
           <a:p>
             <a:fld id="{4A1B796E-3F27-498F-B926-603C854E15E7}" type="datetimeFigureOut">
               <a:rPr lang="en-GB" smtClean="0"/>
-              <a:t>24/01/2020</a:t>
+              <a:t>27/01/2020</a:t>
             </a:fld>
             <a:endParaRPr lang="en-GB"/>
           </a:p>
@@ -1973,7 +1979,7 @@
           <a:p>
             <a:fld id="{4A1B796E-3F27-498F-B926-603C854E15E7}" type="datetimeFigureOut">
               <a:rPr lang="en-GB" smtClean="0"/>
-              <a:t>24/01/2020</a:t>
+              <a:t>27/01/2020</a:t>
             </a:fld>
             <a:endParaRPr lang="en-GB"/>
           </a:p>
@@ -2086,7 +2092,7 @@
           <a:p>
             <a:fld id="{4A1B796E-3F27-498F-B926-603C854E15E7}" type="datetimeFigureOut">
               <a:rPr lang="en-GB" smtClean="0"/>
-              <a:t>24/01/2020</a:t>
+              <a:t>27/01/2020</a:t>
             </a:fld>
             <a:endParaRPr lang="en-GB"/>
           </a:p>
@@ -2399,7 +2405,7 @@
           <a:p>
             <a:fld id="{4A1B796E-3F27-498F-B926-603C854E15E7}" type="datetimeFigureOut">
               <a:rPr lang="en-GB" smtClean="0"/>
-              <a:t>24/01/2020</a:t>
+              <a:t>27/01/2020</a:t>
             </a:fld>
             <a:endParaRPr lang="en-GB"/>
           </a:p>
@@ -2688,7 +2694,7 @@
           <a:p>
             <a:fld id="{4A1B796E-3F27-498F-B926-603C854E15E7}" type="datetimeFigureOut">
               <a:rPr lang="en-GB" smtClean="0"/>
-              <a:t>24/01/2020</a:t>
+              <a:t>27/01/2020</a:t>
             </a:fld>
             <a:endParaRPr lang="en-GB"/>
           </a:p>
@@ -2931,7 +2937,7 @@
           <a:p>
             <a:fld id="{4A1B796E-3F27-498F-B926-603C854E15E7}" type="datetimeFigureOut">
               <a:rPr lang="en-GB" smtClean="0"/>
-              <a:t>24/01/2020</a:t>
+              <a:t>27/01/2020</a:t>
             </a:fld>
             <a:endParaRPr lang="en-GB"/>
           </a:p>
@@ -3625,7 +3631,7 @@
           <p:cNvPr id="2" name="Title 1">
             <a:extLst>
               <a:ext uri="{FF2B5EF4-FFF2-40B4-BE49-F238E27FC236}">
-                <a16:creationId xmlns:a16="http://schemas.microsoft.com/office/drawing/2014/main" id="{091C9952-2C23-4B72-AF98-1D7E8FF948B6}"/>
+                <a16:creationId xmlns:a16="http://schemas.microsoft.com/office/drawing/2014/main" id="{AA196B8C-6630-4990-9A59-D1FF64D088B3}"/>
               </a:ext>
             </a:extLst>
           </p:cNvPr>
@@ -3641,122 +3647,39 @@
           <a:bodyPr/>
           <a:lstStyle/>
           <a:p>
-            <a:r>
-              <a:rPr lang="en-GB" dirty="0"/>
-              <a:t>Air static</a:t>
-            </a:r>
-          </a:p>
-        </p:txBody>
-      </p:sp>
-      <p:pic>
-        <p:nvPicPr>
-          <p:cNvPr id="5" name="Content Placeholder 4">
-            <a:extLst>
-              <a:ext uri="{FF2B5EF4-FFF2-40B4-BE49-F238E27FC236}">
-                <a16:creationId xmlns:a16="http://schemas.microsoft.com/office/drawing/2014/main" id="{00993D47-3D9C-47AE-B9D0-5288414F43AA}"/>
-              </a:ext>
-            </a:extLst>
-          </p:cNvPr>
-          <p:cNvPicPr>
-            <a:picLocks noGrp="1" noChangeAspect="1"/>
-          </p:cNvPicPr>
+            <a:endParaRPr lang="en-GB"/>
+          </a:p>
+        </p:txBody>
+      </p:sp>
+      <p:sp>
+        <p:nvSpPr>
+          <p:cNvPr id="3" name="Content Placeholder 2">
+            <a:extLst>
+              <a:ext uri="{FF2B5EF4-FFF2-40B4-BE49-F238E27FC236}">
+                <a16:creationId xmlns:a16="http://schemas.microsoft.com/office/drawing/2014/main" id="{1DAA21AB-6AB6-407C-A634-AE5B05668022}"/>
+              </a:ext>
+            </a:extLst>
+          </p:cNvPr>
+          <p:cNvSpPr>
+            <a:spLocks noGrp="1"/>
+          </p:cNvSpPr>
           <p:nvPr>
             <p:ph idx="1"/>
           </p:nvPr>
-        </p:nvPicPr>
-        <p:blipFill>
-          <a:blip r:embed="rId2">
-            <a:extLst>
-              <a:ext uri="{28A0092B-C50C-407E-A947-70E740481C1C}">
-                <a14:useLocalDpi xmlns:a14="http://schemas.microsoft.com/office/drawing/2010/main" val="0"/>
-              </a:ext>
-            </a:extLst>
-          </a:blip>
-          <a:stretch>
-            <a:fillRect/>
-          </a:stretch>
-        </p:blipFill>
-        <p:spPr>
-          <a:xfrm>
-            <a:off x="6157520" y="3078504"/>
-            <a:ext cx="4164834" cy="3123626"/>
-          </a:xfrm>
-        </p:spPr>
-      </p:pic>
-      <p:pic>
-        <p:nvPicPr>
-          <p:cNvPr id="7" name="Picture 6">
-            <a:extLst>
-              <a:ext uri="{FF2B5EF4-FFF2-40B4-BE49-F238E27FC236}">
-                <a16:creationId xmlns:a16="http://schemas.microsoft.com/office/drawing/2014/main" id="{5FB0F0FF-3AA3-4C25-9A43-3D1325FBB3E6}"/>
-              </a:ext>
-            </a:extLst>
-          </p:cNvPr>
-          <p:cNvPicPr>
-            <a:picLocks noChangeAspect="1"/>
-          </p:cNvPicPr>
-          <p:nvPr/>
-        </p:nvPicPr>
-        <p:blipFill>
-          <a:blip r:embed="rId3">
-            <a:extLst>
-              <a:ext uri="{28A0092B-C50C-407E-A947-70E740481C1C}">
-                <a14:useLocalDpi xmlns:a14="http://schemas.microsoft.com/office/drawing/2010/main" val="0"/>
-              </a:ext>
-            </a:extLst>
-          </a:blip>
-          <a:stretch>
-            <a:fillRect/>
-          </a:stretch>
-        </p:blipFill>
-        <p:spPr>
-          <a:xfrm>
-            <a:off x="1308682" y="2801649"/>
-            <a:ext cx="4634643" cy="3475982"/>
-          </a:xfrm>
-          <a:prstGeom prst="rect">
-            <a:avLst/>
-          </a:prstGeom>
-        </p:spPr>
-      </p:pic>
-      <p:sp>
-        <p:nvSpPr>
-          <p:cNvPr id="9" name="Rectangle 8">
-            <a:extLst>
-              <a:ext uri="{FF2B5EF4-FFF2-40B4-BE49-F238E27FC236}">
-                <a16:creationId xmlns:a16="http://schemas.microsoft.com/office/drawing/2014/main" id="{C05D2203-353A-4CF6-A43E-84E8AF73C6AA}"/>
-              </a:ext>
-            </a:extLst>
-          </p:cNvPr>
-          <p:cNvSpPr/>
-          <p:nvPr/>
-        </p:nvSpPr>
-        <p:spPr>
-          <a:xfrm>
-            <a:off x="2012067" y="1830598"/>
-            <a:ext cx="3227871" cy="369332"/>
-          </a:xfrm>
-          <a:prstGeom prst="rect">
-            <a:avLst/>
-          </a:prstGeom>
-        </p:spPr>
-        <p:txBody>
-          <a:bodyPr wrap="none">
-            <a:spAutoFit/>
-          </a:bodyPr>
-          <a:lstStyle/>
-          <a:p>
-            <a:r>
-              <a:rPr lang="en-GB" dirty="0"/>
-              <a:t>0120_1609_WO3196_ohmic_air</a:t>
-            </a:r>
+        </p:nvSpPr>
+        <p:spPr/>
+        <p:txBody>
+          <a:bodyPr/>
+          <a:lstStyle/>
+          <a:p>
+            <a:endParaRPr lang="en-GB"/>
           </a:p>
         </p:txBody>
       </p:sp>
     </p:spTree>
     <p:extLst>
       <p:ext uri="{BB962C8B-B14F-4D97-AF65-F5344CB8AC3E}">
-        <p14:creationId xmlns:p14="http://schemas.microsoft.com/office/powerpoint/2010/main" val="20724444"/>
+        <p14:creationId xmlns:p14="http://schemas.microsoft.com/office/powerpoint/2010/main" val="3159232767"/>
       </p:ext>
     </p:extLst>
   </p:cSld>
@@ -3788,6 +3711,169 @@
           <p:cNvPr id="2" name="Title 1">
             <a:extLst>
               <a:ext uri="{FF2B5EF4-FFF2-40B4-BE49-F238E27FC236}">
+                <a16:creationId xmlns:a16="http://schemas.microsoft.com/office/drawing/2014/main" id="{091C9952-2C23-4B72-AF98-1D7E8FF948B6}"/>
+              </a:ext>
+            </a:extLst>
+          </p:cNvPr>
+          <p:cNvSpPr>
+            <a:spLocks noGrp="1"/>
+          </p:cNvSpPr>
+          <p:nvPr>
+            <p:ph type="title"/>
+          </p:nvPr>
+        </p:nvSpPr>
+        <p:spPr/>
+        <p:txBody>
+          <a:bodyPr/>
+          <a:lstStyle/>
+          <a:p>
+            <a:r>
+              <a:rPr lang="en-GB" dirty="0"/>
+              <a:t>Air static</a:t>
+            </a:r>
+          </a:p>
+        </p:txBody>
+      </p:sp>
+      <p:pic>
+        <p:nvPicPr>
+          <p:cNvPr id="5" name="Content Placeholder 4">
+            <a:extLst>
+              <a:ext uri="{FF2B5EF4-FFF2-40B4-BE49-F238E27FC236}">
+                <a16:creationId xmlns:a16="http://schemas.microsoft.com/office/drawing/2014/main" id="{00993D47-3D9C-47AE-B9D0-5288414F43AA}"/>
+              </a:ext>
+            </a:extLst>
+          </p:cNvPr>
+          <p:cNvPicPr>
+            <a:picLocks noGrp="1" noChangeAspect="1"/>
+          </p:cNvPicPr>
+          <p:nvPr>
+            <p:ph idx="1"/>
+          </p:nvPr>
+        </p:nvPicPr>
+        <p:blipFill>
+          <a:blip r:embed="rId2">
+            <a:extLst>
+              <a:ext uri="{28A0092B-C50C-407E-A947-70E740481C1C}">
+                <a14:useLocalDpi xmlns:a14="http://schemas.microsoft.com/office/drawing/2010/main" val="0"/>
+              </a:ext>
+            </a:extLst>
+          </a:blip>
+          <a:stretch>
+            <a:fillRect/>
+          </a:stretch>
+        </p:blipFill>
+        <p:spPr>
+          <a:xfrm>
+            <a:off x="6157520" y="3078504"/>
+            <a:ext cx="4164834" cy="3123626"/>
+          </a:xfrm>
+        </p:spPr>
+      </p:pic>
+      <p:pic>
+        <p:nvPicPr>
+          <p:cNvPr id="7" name="Picture 6">
+            <a:extLst>
+              <a:ext uri="{FF2B5EF4-FFF2-40B4-BE49-F238E27FC236}">
+                <a16:creationId xmlns:a16="http://schemas.microsoft.com/office/drawing/2014/main" id="{5FB0F0FF-3AA3-4C25-9A43-3D1325FBB3E6}"/>
+              </a:ext>
+            </a:extLst>
+          </p:cNvPr>
+          <p:cNvPicPr>
+            <a:picLocks noChangeAspect="1"/>
+          </p:cNvPicPr>
+          <p:nvPr/>
+        </p:nvPicPr>
+        <p:blipFill>
+          <a:blip r:embed="rId3">
+            <a:extLst>
+              <a:ext uri="{28A0092B-C50C-407E-A947-70E740481C1C}">
+                <a14:useLocalDpi xmlns:a14="http://schemas.microsoft.com/office/drawing/2010/main" val="0"/>
+              </a:ext>
+            </a:extLst>
+          </a:blip>
+          <a:stretch>
+            <a:fillRect/>
+          </a:stretch>
+        </p:blipFill>
+        <p:spPr>
+          <a:xfrm>
+            <a:off x="1308682" y="2801649"/>
+            <a:ext cx="4634643" cy="3475982"/>
+          </a:xfrm>
+          <a:prstGeom prst="rect">
+            <a:avLst/>
+          </a:prstGeom>
+        </p:spPr>
+      </p:pic>
+      <p:sp>
+        <p:nvSpPr>
+          <p:cNvPr id="9" name="Rectangle 8">
+            <a:extLst>
+              <a:ext uri="{FF2B5EF4-FFF2-40B4-BE49-F238E27FC236}">
+                <a16:creationId xmlns:a16="http://schemas.microsoft.com/office/drawing/2014/main" id="{C05D2203-353A-4CF6-A43E-84E8AF73C6AA}"/>
+              </a:ext>
+            </a:extLst>
+          </p:cNvPr>
+          <p:cNvSpPr/>
+          <p:nvPr/>
+        </p:nvSpPr>
+        <p:spPr>
+          <a:xfrm>
+            <a:off x="2012067" y="1830598"/>
+            <a:ext cx="3227871" cy="369332"/>
+          </a:xfrm>
+          <a:prstGeom prst="rect">
+            <a:avLst/>
+          </a:prstGeom>
+        </p:spPr>
+        <p:txBody>
+          <a:bodyPr wrap="none">
+            <a:spAutoFit/>
+          </a:bodyPr>
+          <a:lstStyle/>
+          <a:p>
+            <a:r>
+              <a:rPr lang="en-GB" dirty="0"/>
+              <a:t>0120_1609_WO3196_ohmic_air</a:t>
+            </a:r>
+          </a:p>
+        </p:txBody>
+      </p:sp>
+    </p:spTree>
+    <p:extLst>
+      <p:ext uri="{BB962C8B-B14F-4D97-AF65-F5344CB8AC3E}">
+        <p14:creationId xmlns:p14="http://schemas.microsoft.com/office/powerpoint/2010/main" val="20724444"/>
+      </p:ext>
+    </p:extLst>
+  </p:cSld>
+  <p:clrMapOvr>
+    <a:masterClrMapping/>
+  </p:clrMapOvr>
+</p:sld>
+</file>
+
+<file path=ppt/slides/slide4.xml><?xml version="1.0" encoding="utf-8"?>
+<p:sld xmlns:a="http://schemas.openxmlformats.org/drawingml/2006/main" xmlns:r="http://schemas.openxmlformats.org/officeDocument/2006/relationships" xmlns:p="http://schemas.openxmlformats.org/presentationml/2006/main">
+  <p:cSld>
+    <p:spTree>
+      <p:nvGrpSpPr>
+        <p:cNvPr id="1" name=""/>
+        <p:cNvGrpSpPr/>
+        <p:nvPr/>
+      </p:nvGrpSpPr>
+      <p:grpSpPr>
+        <a:xfrm>
+          <a:off x="0" y="0"/>
+          <a:ext cx="0" cy="0"/>
+          <a:chOff x="0" y="0"/>
+          <a:chExt cx="0" cy="0"/>
+        </a:xfrm>
+      </p:grpSpPr>
+      <p:sp>
+        <p:nvSpPr>
+          <p:cNvPr id="2" name="Title 1">
+            <a:extLst>
+              <a:ext uri="{FF2B5EF4-FFF2-40B4-BE49-F238E27FC236}">
                 <a16:creationId xmlns:a16="http://schemas.microsoft.com/office/drawing/2014/main" id="{2C942E87-8A0A-4D5B-BBCA-8E1090CE358C}"/>
               </a:ext>
             </a:extLst>
@@ -4001,7 +4087,7 @@
 </p:sld>
 </file>
 
-<file path=ppt/slides/slide4.xml><?xml version="1.0" encoding="utf-8"?>
+<file path=ppt/slides/slide5.xml><?xml version="1.0" encoding="utf-8"?>
 <p:sld xmlns:a="http://schemas.openxmlformats.org/drawingml/2006/main" xmlns:r="http://schemas.openxmlformats.org/officeDocument/2006/relationships" xmlns:p="http://schemas.openxmlformats.org/presentationml/2006/main">
   <p:cSld>
     <p:spTree>
@@ -4156,7 +4242,7 @@
 </p:sld>
 </file>
 
-<file path=ppt/slides/slide5.xml><?xml version="1.0" encoding="utf-8"?>
+<file path=ppt/slides/slide6.xml><?xml version="1.0" encoding="utf-8"?>
 <p:sld xmlns:a="http://schemas.openxmlformats.org/drawingml/2006/main" xmlns:r="http://schemas.openxmlformats.org/officeDocument/2006/relationships" xmlns:p="http://schemas.openxmlformats.org/presentationml/2006/main">
   <p:cSld>
     <p:spTree>
@@ -4355,7 +4441,7 @@
 </p:sld>
 </file>
 
-<file path=ppt/slides/slide6.xml><?xml version="1.0" encoding="utf-8"?>
+<file path=ppt/slides/slide7.xml><?xml version="1.0" encoding="utf-8"?>
 <p:sld xmlns:a="http://schemas.openxmlformats.org/drawingml/2006/main" xmlns:r="http://schemas.openxmlformats.org/officeDocument/2006/relationships" xmlns:p="http://schemas.openxmlformats.org/presentationml/2006/main">
   <p:cSld>
     <p:spTree>
@@ -4484,7 +4570,7 @@
 </p:sld>
 </file>
 
-<file path=ppt/slides/slide7.xml><?xml version="1.0" encoding="utf-8"?>
+<file path=ppt/slides/slide8.xml><?xml version="1.0" encoding="utf-8"?>
 <p:sld xmlns:a="http://schemas.openxmlformats.org/drawingml/2006/main" xmlns:r="http://schemas.openxmlformats.org/officeDocument/2006/relationships" xmlns:p="http://schemas.openxmlformats.org/presentationml/2006/main">
   <p:cSld>
     <p:spTree>

</xml_diff>